<commit_message>
JavaScript OOP Basics - Presentation Update #2
</commit_message>
<xml_diff>
--- a/Muzeiko/JavaScript_SPA_using_NodeJS/02_Meeting_20_October_2018/JavaScript_Object_Oriented_Programming_Basics.pptx
+++ b/Muzeiko/JavaScript_SPA_using_NodeJS/02_Meeting_20_October_2018/JavaScript_Object_Oriented_Programming_Basics.pptx
@@ -329,7 +329,7 @@
           <a:p>
             <a:fld id="{24CE221E-83ED-4F6C-BA5F-3F9E6FDB6953}" type="datetimeFigureOut">
               <a:rPr lang="en-US"/>
-              <a:t>10/20/2018</a:t>
+              <a:t>10/21/2018</a:t>
             </a:fld>
             <a:endParaRPr dirty="0"/>
           </a:p>
@@ -494,7 +494,7 @@
           <a:p>
             <a:fld id="{97853E5F-CE67-483C-A264-F17AC70E9CA2}" type="datetimeFigureOut">
               <a:rPr lang="en-US"/>
-              <a:t>10/20/2018</a:t>
+              <a:t>10/21/2018</a:t>
             </a:fld>
             <a:endParaRPr dirty="0"/>
           </a:p>
@@ -1086,7 +1086,7 @@
           <a:p>
             <a:fld id="{3E0FA9E5-6744-4841-888F-9E7CC0C2B7EC}" type="datetimeFigureOut">
               <a:rPr lang="en-US" smtClean="0"/>
-              <a:t>10/20/2018</a:t>
+              <a:t>10/21/2018</a:t>
             </a:fld>
             <a:endParaRPr lang="en-US" dirty="0"/>
           </a:p>
@@ -1276,7 +1276,7 @@
           <a:p>
             <a:fld id="{3E0FA9E5-6744-4841-888F-9E7CC0C2B7EC}" type="datetimeFigureOut">
               <a:rPr lang="en-US" smtClean="0"/>
-              <a:t>10/20/2018</a:t>
+              <a:t>10/21/2018</a:t>
             </a:fld>
             <a:endParaRPr lang="en-US" dirty="0"/>
           </a:p>
@@ -1471,7 +1471,7 @@
           <a:p>
             <a:fld id="{3E0FA9E5-6744-4841-888F-9E7CC0C2B7EC}" type="datetimeFigureOut">
               <a:rPr lang="en-US" smtClean="0"/>
-              <a:t>10/20/2018</a:t>
+              <a:t>10/21/2018</a:t>
             </a:fld>
             <a:endParaRPr lang="en-US" dirty="0"/>
           </a:p>
@@ -1656,7 +1656,7 @@
           <a:p>
             <a:fld id="{3E0FA9E5-6744-4841-888F-9E7CC0C2B7EC}" type="datetimeFigureOut">
               <a:rPr lang="en-US" smtClean="0"/>
-              <a:t>10/20/2018</a:t>
+              <a:t>10/21/2018</a:t>
             </a:fld>
             <a:endParaRPr lang="en-US" dirty="0"/>
           </a:p>
@@ -1925,7 +1925,7 @@
           <a:p>
             <a:fld id="{3E0FA9E5-6744-4841-888F-9E7CC0C2B7EC}" type="datetimeFigureOut">
               <a:rPr lang="en-US" smtClean="0"/>
-              <a:t>10/20/2018</a:t>
+              <a:t>10/21/2018</a:t>
             </a:fld>
             <a:endParaRPr lang="en-US" dirty="0"/>
           </a:p>
@@ -2232,7 +2232,7 @@
           <a:p>
             <a:fld id="{3E0FA9E5-6744-4841-888F-9E7CC0C2B7EC}" type="datetimeFigureOut">
               <a:rPr lang="en-US" smtClean="0"/>
-              <a:t>10/20/2018</a:t>
+              <a:t>10/21/2018</a:t>
             </a:fld>
             <a:endParaRPr lang="en-US" dirty="0"/>
           </a:p>
@@ -2688,7 +2688,7 @@
           <a:p>
             <a:fld id="{3E0FA9E5-6744-4841-888F-9E7CC0C2B7EC}" type="datetimeFigureOut">
               <a:rPr lang="en-US" smtClean="0"/>
-              <a:t>10/20/2018</a:t>
+              <a:t>10/21/2018</a:t>
             </a:fld>
             <a:endParaRPr lang="en-US" dirty="0"/>
           </a:p>
@@ -2821,7 +2821,7 @@
           <a:p>
             <a:fld id="{3E0FA9E5-6744-4841-888F-9E7CC0C2B7EC}" type="datetimeFigureOut">
               <a:rPr lang="en-US" smtClean="0"/>
-              <a:t>10/20/2018</a:t>
+              <a:t>10/21/2018</a:t>
             </a:fld>
             <a:endParaRPr lang="en-US" dirty="0"/>
           </a:p>
@@ -2931,7 +2931,7 @@
           <a:p>
             <a:fld id="{3E0FA9E5-6744-4841-888F-9E7CC0C2B7EC}" type="datetimeFigureOut">
               <a:rPr lang="en-US" smtClean="0"/>
-              <a:t>10/20/2018</a:t>
+              <a:t>10/21/2018</a:t>
             </a:fld>
             <a:endParaRPr lang="en-US" dirty="0"/>
           </a:p>
@@ -3242,7 +3242,7 @@
           <a:p>
             <a:fld id="{3E0FA9E5-6744-4841-888F-9E7CC0C2B7EC}" type="datetimeFigureOut">
               <a:rPr lang="en-US" smtClean="0"/>
-              <a:t>10/20/2018</a:t>
+              <a:t>10/21/2018</a:t>
             </a:fld>
             <a:endParaRPr lang="en-US" dirty="0"/>
           </a:p>
@@ -3719,7 +3719,7 @@
             <a:fld id="{3E0FA9E5-6744-4841-888F-9E7CC0C2B7EC}" type="datetimeFigureOut">
               <a:rPr lang="en-US" smtClean="0"/>
               <a:pPr/>
-              <a:t>10/20/2018</a:t>
+              <a:t>10/21/2018</a:t>
             </a:fld>
             <a:endParaRPr lang="en-US" dirty="0"/>
           </a:p>
@@ -5720,7 +5720,15 @@
           <a:p>
             <a:r>
               <a:rPr lang="bg-BG" dirty="0"/>
-              <a:t>Обектно ориентирано пограмиране?</a:t>
+              <a:t>Обектно </a:t>
+            </a:r>
+            <a:r>
+              <a:rPr lang="bg-BG"/>
+              <a:t>ориентирано програмиране</a:t>
+            </a:r>
+            <a:r>
+              <a:rPr lang="bg-BG" dirty="0"/>
+              <a:t>?</a:t>
             </a:r>
           </a:p>
           <a:p>

</xml_diff>